<commit_message>
other modules, service provider
</commit_message>
<xml_diff>
--- a/java9.pptx
+++ b/java9.pptx
@@ -8,6 +8,7 @@
     <p:sldId id="256" r:id="rId2"/>
     <p:sldId id="257" r:id="rId3"/>
     <p:sldId id="258" r:id="rId4"/>
+    <p:sldId id="259" r:id="rId5"/>
   </p:sldIdLst>
   <p:sldSz cx="12192000" cy="6858000"/>
   <p:notesSz cx="6858000" cy="9144000"/>
@@ -245,7 +246,7 @@
           <a:p>
             <a:fld id="{5CB64A52-B668-4BDF-ABBD-619ACD66ADAA}" type="datetimeFigureOut">
               <a:rPr lang="fr-FR" smtClean="0"/>
-              <a:t>10/11/2017</a:t>
+              <a:t>14/11/2017</a:t>
             </a:fld>
             <a:endParaRPr lang="fr-FR"/>
           </a:p>
@@ -415,7 +416,7 @@
           <a:p>
             <a:fld id="{5CB64A52-B668-4BDF-ABBD-619ACD66ADAA}" type="datetimeFigureOut">
               <a:rPr lang="fr-FR" smtClean="0"/>
-              <a:t>10/11/2017</a:t>
+              <a:t>14/11/2017</a:t>
             </a:fld>
             <a:endParaRPr lang="fr-FR"/>
           </a:p>
@@ -595,7 +596,7 @@
           <a:p>
             <a:fld id="{5CB64A52-B668-4BDF-ABBD-619ACD66ADAA}" type="datetimeFigureOut">
               <a:rPr lang="fr-FR" smtClean="0"/>
-              <a:t>10/11/2017</a:t>
+              <a:t>14/11/2017</a:t>
             </a:fld>
             <a:endParaRPr lang="fr-FR"/>
           </a:p>
@@ -765,7 +766,7 @@
           <a:p>
             <a:fld id="{5CB64A52-B668-4BDF-ABBD-619ACD66ADAA}" type="datetimeFigureOut">
               <a:rPr lang="fr-FR" smtClean="0"/>
-              <a:t>10/11/2017</a:t>
+              <a:t>14/11/2017</a:t>
             </a:fld>
             <a:endParaRPr lang="fr-FR"/>
           </a:p>
@@ -1011,7 +1012,7 @@
           <a:p>
             <a:fld id="{5CB64A52-B668-4BDF-ABBD-619ACD66ADAA}" type="datetimeFigureOut">
               <a:rPr lang="fr-FR" smtClean="0"/>
-              <a:t>10/11/2017</a:t>
+              <a:t>14/11/2017</a:t>
             </a:fld>
             <a:endParaRPr lang="fr-FR"/>
           </a:p>
@@ -1243,7 +1244,7 @@
           <a:p>
             <a:fld id="{5CB64A52-B668-4BDF-ABBD-619ACD66ADAA}" type="datetimeFigureOut">
               <a:rPr lang="fr-FR" smtClean="0"/>
-              <a:t>10/11/2017</a:t>
+              <a:t>14/11/2017</a:t>
             </a:fld>
             <a:endParaRPr lang="fr-FR"/>
           </a:p>
@@ -1610,7 +1611,7 @@
           <a:p>
             <a:fld id="{5CB64A52-B668-4BDF-ABBD-619ACD66ADAA}" type="datetimeFigureOut">
               <a:rPr lang="fr-FR" smtClean="0"/>
-              <a:t>10/11/2017</a:t>
+              <a:t>14/11/2017</a:t>
             </a:fld>
             <a:endParaRPr lang="fr-FR"/>
           </a:p>
@@ -1728,7 +1729,7 @@
           <a:p>
             <a:fld id="{5CB64A52-B668-4BDF-ABBD-619ACD66ADAA}" type="datetimeFigureOut">
               <a:rPr lang="fr-FR" smtClean="0"/>
-              <a:t>10/11/2017</a:t>
+              <a:t>14/11/2017</a:t>
             </a:fld>
             <a:endParaRPr lang="fr-FR"/>
           </a:p>
@@ -1823,7 +1824,7 @@
           <a:p>
             <a:fld id="{5CB64A52-B668-4BDF-ABBD-619ACD66ADAA}" type="datetimeFigureOut">
               <a:rPr lang="fr-FR" smtClean="0"/>
-              <a:t>10/11/2017</a:t>
+              <a:t>14/11/2017</a:t>
             </a:fld>
             <a:endParaRPr lang="fr-FR"/>
           </a:p>
@@ -2100,7 +2101,7 @@
           <a:p>
             <a:fld id="{5CB64A52-B668-4BDF-ABBD-619ACD66ADAA}" type="datetimeFigureOut">
               <a:rPr lang="fr-FR" smtClean="0"/>
-              <a:t>10/11/2017</a:t>
+              <a:t>14/11/2017</a:t>
             </a:fld>
             <a:endParaRPr lang="fr-FR"/>
           </a:p>
@@ -2353,7 +2354,7 @@
           <a:p>
             <a:fld id="{5CB64A52-B668-4BDF-ABBD-619ACD66ADAA}" type="datetimeFigureOut">
               <a:rPr lang="fr-FR" smtClean="0"/>
-              <a:t>10/11/2017</a:t>
+              <a:t>14/11/2017</a:t>
             </a:fld>
             <a:endParaRPr lang="fr-FR"/>
           </a:p>
@@ -2566,7 +2567,7 @@
           <a:p>
             <a:fld id="{5CB64A52-B668-4BDF-ABBD-619ACD66ADAA}" type="datetimeFigureOut">
               <a:rPr lang="fr-FR" smtClean="0"/>
-              <a:t>10/11/2017</a:t>
+              <a:t>14/11/2017</a:t>
             </a:fld>
             <a:endParaRPr lang="fr-FR"/>
           </a:p>
@@ -3421,6 +3422,199 @@
 </p:sld>
 </file>
 
+<file path=ppt/slides/slide4.xml><?xml version="1.0" encoding="utf-8"?>
+<p:sld xmlns:a="http://schemas.openxmlformats.org/drawingml/2006/main" xmlns:r="http://schemas.openxmlformats.org/officeDocument/2006/relationships" xmlns:p="http://schemas.openxmlformats.org/presentationml/2006/main">
+  <p:cSld>
+    <p:spTree>
+      <p:nvGrpSpPr>
+        <p:cNvPr id="1" name=""/>
+        <p:cNvGrpSpPr/>
+        <p:nvPr/>
+      </p:nvGrpSpPr>
+      <p:grpSpPr>
+        <a:xfrm>
+          <a:off x="0" y="0"/>
+          <a:ext cx="0" cy="0"/>
+          <a:chOff x="0" y="0"/>
+          <a:chExt cx="0" cy="0"/>
+        </a:xfrm>
+      </p:grpSpPr>
+      <p:sp>
+        <p:nvSpPr>
+          <p:cNvPr id="4" name="ZoneTexte 3"/>
+          <p:cNvSpPr txBox="1"/>
+          <p:nvPr/>
+        </p:nvSpPr>
+        <p:spPr>
+          <a:xfrm>
+            <a:off x="1307592" y="704088"/>
+            <a:ext cx="9592056" cy="4247317"/>
+          </a:xfrm>
+          <a:prstGeom prst="rect">
+            <a:avLst/>
+          </a:prstGeom>
+          <a:noFill/>
+        </p:spPr>
+        <p:txBody>
+          <a:bodyPr wrap="square" rtlCol="0">
+            <a:spAutoFit/>
+          </a:bodyPr>
+          <a:lstStyle/>
+          <a:p>
+            <a:pPr algn="ctr"/>
+            <a:endParaRPr lang="en-US" dirty="0" smtClean="0"/>
+          </a:p>
+          <a:p>
+            <a:pPr marL="285750" indent="-285750">
+              <a:buFont typeface="Arial" panose="020B0604020202020204" pitchFamily="34" charset="0"/>
+              <a:buChar char="•"/>
+            </a:pPr>
+            <a:endParaRPr lang="en-US" dirty="0"/>
+          </a:p>
+          <a:p>
+            <a:endParaRPr lang="en-US" dirty="0"/>
+          </a:p>
+          <a:p>
+            <a:pPr marL="285750" indent="-285750">
+              <a:buFont typeface="Arial" panose="020B0604020202020204" pitchFamily="34" charset="0"/>
+              <a:buChar char="•"/>
+            </a:pPr>
+            <a:r>
+              <a:rPr lang="en-US" dirty="0"/>
+              <a:t>Public only within the defining </a:t>
+            </a:r>
+            <a:r>
+              <a:rPr lang="en-US" dirty="0" smtClean="0"/>
+              <a:t>module (No exports)</a:t>
+            </a:r>
+          </a:p>
+          <a:p>
+            <a:endParaRPr lang="en-US" dirty="0"/>
+          </a:p>
+          <a:p>
+            <a:pPr marL="285750" indent="-285750">
+              <a:buFont typeface="Arial" panose="020B0604020202020204" pitchFamily="34" charset="0"/>
+              <a:buChar char="•"/>
+            </a:pPr>
+            <a:r>
+              <a:rPr lang="en-US" dirty="0"/>
+              <a:t>Public only to specific </a:t>
+            </a:r>
+            <a:r>
+              <a:rPr lang="en-US" dirty="0" smtClean="0"/>
+              <a:t>modules (exports to a specific module)</a:t>
+            </a:r>
+          </a:p>
+          <a:p>
+            <a:endParaRPr lang="en-US" dirty="0"/>
+          </a:p>
+          <a:p>
+            <a:pPr marL="285750" indent="-285750">
+              <a:buFont typeface="Arial" panose="020B0604020202020204" pitchFamily="34" charset="0"/>
+              <a:buChar char="•"/>
+            </a:pPr>
+            <a:r>
+              <a:rPr lang="en-US" dirty="0"/>
+              <a:t>Public to </a:t>
+            </a:r>
+            <a:r>
+              <a:rPr lang="en-US" dirty="0" smtClean="0"/>
+              <a:t>everyone (exports)</a:t>
+            </a:r>
+          </a:p>
+          <a:p>
+            <a:pPr marL="285750" indent="-285750">
+              <a:buFont typeface="Arial" panose="020B0604020202020204" pitchFamily="34" charset="0"/>
+              <a:buChar char="•"/>
+            </a:pPr>
+            <a:endParaRPr lang="en-US" dirty="0"/>
+          </a:p>
+          <a:p>
+            <a:pPr marL="285750" indent="-285750">
+              <a:buFont typeface="Arial" panose="020B0604020202020204" pitchFamily="34" charset="0"/>
+              <a:buChar char="•"/>
+            </a:pPr>
+            <a:r>
+              <a:rPr lang="en-US" dirty="0"/>
+              <a:t>E</a:t>
+            </a:r>
+            <a:r>
+              <a:rPr lang="en-US" dirty="0" smtClean="0"/>
+              <a:t>xported </a:t>
+            </a:r>
+            <a:r>
+              <a:rPr lang="en-US" dirty="0"/>
+              <a:t>package: </a:t>
+            </a:r>
+            <a:r>
+              <a:rPr lang="en-US" dirty="0" smtClean="0"/>
+              <a:t>access </a:t>
+            </a:r>
+            <a:r>
+              <a:rPr lang="en-US" dirty="0"/>
+              <a:t>to only public types and their public </a:t>
+            </a:r>
+            <a:r>
+              <a:rPr lang="en-US" dirty="0" smtClean="0"/>
+              <a:t>members at </a:t>
+            </a:r>
+            <a:r>
+              <a:rPr lang="en-US" dirty="0"/>
+              <a:t>compile-time and runtime. </a:t>
+            </a:r>
+            <a:endParaRPr lang="en-US" dirty="0" smtClean="0"/>
+          </a:p>
+          <a:p>
+            <a:endParaRPr lang="en-US" dirty="0"/>
+          </a:p>
+          <a:p>
+            <a:pPr marL="285750" indent="-285750">
+              <a:buFont typeface="Arial" panose="020B0604020202020204" pitchFamily="34" charset="0"/>
+              <a:buChar char="•"/>
+            </a:pPr>
+            <a:r>
+              <a:rPr lang="en-US" dirty="0" smtClean="0"/>
+              <a:t>Open </a:t>
+            </a:r>
+            <a:r>
+              <a:rPr lang="en-US" dirty="0"/>
+              <a:t>module: allow deep reflection on all types in all packages in </a:t>
+            </a:r>
+            <a:r>
+              <a:rPr lang="en-US" dirty="0" smtClean="0"/>
+              <a:t>that module </a:t>
+            </a:r>
+            <a:r>
+              <a:rPr lang="en-US" dirty="0"/>
+              <a:t>at runtime (possibility to open only one or more packages).</a:t>
+            </a:r>
+            <a:endParaRPr lang="en-US" dirty="0" smtClean="0"/>
+          </a:p>
+          <a:p>
+            <a:endParaRPr lang="en-US" dirty="0"/>
+          </a:p>
+        </p:txBody>
+      </p:sp>
+    </p:spTree>
+    <p:extLst>
+      <p:ext uri="{BB962C8B-B14F-4D97-AF65-F5344CB8AC3E}">
+        <p14:creationId xmlns:p14="http://schemas.microsoft.com/office/powerpoint/2010/main" val="3258970782"/>
+      </p:ext>
+    </p:extLst>
+  </p:cSld>
+  <p:clrMapOvr>
+    <a:masterClrMapping/>
+  </p:clrMapOvr>
+  <p:timing>
+    <p:tnLst>
+      <p:par>
+        <p:cTn id="1" dur="indefinite" restart="never" nodeType="tmRoot"/>
+      </p:par>
+    </p:tnLst>
+  </p:timing>
+</p:sld>
+</file>
+
 <file path=ppt/theme/theme1.xml><?xml version="1.0" encoding="utf-8"?>
 <a:theme xmlns:a="http://schemas.openxmlformats.org/drawingml/2006/main" name="Thème Office">
   <a:themeElements>

</xml_diff>